<commit_message>
Second Draft of Expo Poster
</commit_message>
<xml_diff>
--- a/docs/expo-poster.pptx
+++ b/docs/expo-poster.pptx
@@ -243,7 +243,7 @@
             <a:fld id="{9CF59EBC-EC05-6B4D-B166-DDFA6A1EDCB6}" type="datetimeFigureOut">
               <a:rPr lang="en-US" smtClean="0"/>
               <a:pPr/>
-              <a:t>2/11/2020</a:t>
+              <a:t>2/14/2020</a:t>
             </a:fld>
             <a:endParaRPr lang="en-US" dirty="0"/>
           </a:p>
@@ -1820,31 +1820,6 @@
       </p:grpSpPr>
       <p:pic>
         <p:nvPicPr>
-          <p:cNvPr id="5" name="Picture Placeholder 4" descr="A close up of text on a white background&#10;&#10;Description automatically generated">
-            <a:extLst>
-              <a:ext uri="{FF2B5EF4-FFF2-40B4-BE49-F238E27FC236}">
-                <a16:creationId xmlns:a16="http://schemas.microsoft.com/office/drawing/2014/main" id="{53657178-8547-43CA-B993-11763A780CAF}"/>
-              </a:ext>
-            </a:extLst>
-          </p:cNvPr>
-          <p:cNvPicPr>
-            <a:picLocks noGrp="1" noChangeAspect="1"/>
-          </p:cNvPicPr>
-          <p:nvPr>
-            <p:ph type="pic" sz="quarter" idx="10"/>
-          </p:nvPr>
-        </p:nvPicPr>
-        <p:blipFill>
-          <a:blip r:embed="rId2"/>
-          <a:srcRect t="1707" b="1707"/>
-          <a:stretch>
-            <a:fillRect/>
-          </a:stretch>
-        </p:blipFill>
-        <p:spPr/>
-      </p:pic>
-      <p:pic>
-        <p:nvPicPr>
           <p:cNvPr id="18" name="Picture Placeholder 17" descr="A picture containing toy, white, sitting, orange&#10;&#10;Description automatically generated">
             <a:extLst>
               <a:ext uri="{FF2B5EF4-FFF2-40B4-BE49-F238E27FC236}">
@@ -1860,10 +1835,10 @@
           </p:nvPr>
         </p:nvPicPr>
         <p:blipFill>
-          <a:blip r:embed="rId3">
+          <a:blip r:embed="rId2">
             <a:extLst>
               <a:ext uri="{837473B0-CC2E-450A-ABE3-18F120FF3D39}">
-                <a1611:picAttrSrcUrl xmlns:a1611="http://schemas.microsoft.com/office/drawing/2016/11/main" r:id="rId4"/>
+                <a1611:picAttrSrcUrl xmlns:a1611="http://schemas.microsoft.com/office/drawing/2016/11/main" r:id="rId3"/>
               </a:ext>
             </a:extLst>
           </a:blip>
@@ -2088,7 +2063,7 @@
         <p:spPr>
           <a:xfrm>
             <a:off x="12292014" y="24061092"/>
-            <a:ext cx="9418320" cy="7069949"/>
+            <a:ext cx="9418320" cy="5864491"/>
           </a:xfrm>
           <a:prstGeom prst="rect">
             <a:avLst/>
@@ -2279,7 +2254,7 @@
                 <a:latin typeface="Verdana Regular"/>
                 <a:ea typeface="Verdana" panose="020B0604030504040204" pitchFamily="34" charset="0"/>
               </a:rPr>
-              <a:t>We have developed a mobile application that will eliminate the need for a handwritten form (figure 1), and can produce a professional drill log document (figure 2), without the need for commercial software.</a:t>
+              <a:t>We have developed a mobile application that will eliminate the need for a handwritten form, and can produce a professional drill log document, without the need for commercial software.</a:t>
             </a:r>
           </a:p>
           <a:p>
@@ -2311,21 +2286,8 @@
                 <a:latin typeface="Verdana Regular"/>
                 <a:ea typeface="Verdana" panose="020B0604030504040204" pitchFamily="34" charset="0"/>
               </a:rPr>
-              <a:t>The user interface is written with a target audience of people with lots of technical experience with soil and rock analysis.</a:t>
-            </a:r>
-          </a:p>
-          <a:p>
-            <a:pPr marL="457200" indent="-457200">
-              <a:spcAft>
-                <a:spcPts val="2600"/>
-              </a:spcAft>
-              <a:buFont typeface="Arial" panose="020B0604020202020204" pitchFamily="34" charset="0"/>
-              <a:buChar char="•"/>
-            </a:pPr>
-            <a:endParaRPr lang="en-US" dirty="0">
-              <a:latin typeface="Verdana Regular"/>
-              <a:ea typeface="Verdana" panose="020B0604030504040204" pitchFamily="34" charset="0"/>
-            </a:endParaRPr>
+              <a:t>Our development was targeted at mobile devices running Android, with a port to iOS in order to target the most potential users.</a:t>
+            </a:r>
           </a:p>
         </p:txBody>
       </p:sp>
@@ -2755,7 +2717,7 @@
                 <a:latin typeface="Verdana Regular"/>
                 <a:ea typeface="Verdana" panose="020B0604030504040204" pitchFamily="34" charset="0"/>
               </a:rPr>
-              <a:t>Our development was targeted at mobile devices running Android, with the a port to iOS in order to target the most potential users.</a:t>
+              <a:t>Additionally, this application outputs a csv file of the data to be used by another program in order to create a map of drilling sites with a drill log document attached to each site.</a:t>
             </a:r>
           </a:p>
           <a:p>
@@ -2769,7 +2731,7 @@
                 <a:latin typeface="Verdana Regular"/>
                 <a:ea typeface="Verdana" panose="020B0604030504040204" pitchFamily="34" charset="0"/>
               </a:rPr>
-              <a:t>Additionally, this application also outputs a csv file of the data to be used by graduate student  in order to create a map of drilling sites with a drill log document attached to each site.</a:t>
+              <a:t>Statewide usage of this application would lead to an aggregation of subsurface data that will be used to visualize the ground beneath our feet.</a:t>
             </a:r>
           </a:p>
         </p:txBody>
@@ -2983,7 +2945,7 @@
         <p:spPr>
           <a:xfrm>
             <a:off x="1964266" y="6422030"/>
-            <a:ext cx="8126412" cy="5095049"/>
+            <a:ext cx="8126412" cy="5531066"/>
           </a:xfrm>
           <a:prstGeom prst="rect">
             <a:avLst/>
@@ -3178,7 +3140,7 @@
                 <a:latin typeface="Verdana" panose="020B0604030504040204" pitchFamily="34" charset="0"/>
                 <a:ea typeface="Verdana" panose="020B0604030504040204" pitchFamily="34" charset="0"/>
               </a:rPr>
-              <a:t>When working outside of an office, the method we use to record data is very important. This data is not collected just for fun, it will be used for analysis, reports, research, and may be used as evidence to justify important decisions. </a:t>
+              <a:t>When working outside of an office, the method we use to record data is very important. This data will be used for analysis, reports, research, and may be used as evidence to justify important decisions.</a:t>
             </a:r>
           </a:p>
           <a:p>
@@ -3195,7 +3157,7 @@
                 <a:latin typeface="Verdana" panose="020B0604030504040204" pitchFamily="34" charset="0"/>
                 <a:ea typeface="Verdana" panose="020B0604030504040204" pitchFamily="34" charset="0"/>
               </a:rPr>
-              <a:t>The process through which we collect this data should therefore be efficient and free from errors, so that an undue effort is not necessary and the integrity of the data is preserved. </a:t>
+              <a:t>The process through which we collect this data should therefore be efficient and reduce the opportunity for user error as much as possible, so that an undue effort is not necessary and the integrity of the data is preserved. </a:t>
             </a:r>
           </a:p>
         </p:txBody>
@@ -3243,7 +3205,7 @@
           <a:p>
             <a:pPr algn="ctr"/>
             <a:r>
-              <a:rPr lang="en-US" spc="100" dirty="0">
+              <a:rPr lang="en-US" spc="1500" dirty="0">
                 <a:solidFill>
                   <a:srgbClr val="E05529"/>
                 </a:solidFill>
@@ -3889,7 +3851,7 @@
               <a:rPr lang="en-US" dirty="0">
                 <a:latin typeface="Verdana Regular" charset="0"/>
               </a:rPr>
-              <a:t>, for providing rock/soil descriptions used in this application. Along with the format for outputting the csv.</a:t>
+              <a:t>, for providing rock/soil descriptions used in this application. Along with the format of the csv file.</a:t>
             </a:r>
           </a:p>
         </p:txBody>
@@ -4066,116 +4028,6 @@
       </p:sp>
       <p:pic>
         <p:nvPicPr>
-          <p:cNvPr id="22" name="Picture 21" descr="A screen shot of a computer&#10;&#10;Description automatically generated">
-            <a:extLst>
-              <a:ext uri="{FF2B5EF4-FFF2-40B4-BE49-F238E27FC236}">
-                <a16:creationId xmlns:a16="http://schemas.microsoft.com/office/drawing/2014/main" id="{C40239DC-FB52-4507-91B2-692DFE693D5B}"/>
-              </a:ext>
-            </a:extLst>
-          </p:cNvPr>
-          <p:cNvPicPr>
-            <a:picLocks noChangeAspect="1"/>
-          </p:cNvPicPr>
-          <p:nvPr/>
-        </p:nvPicPr>
-        <p:blipFill>
-          <a:blip r:embed="rId5">
-            <a:extLst>
-              <a:ext uri="{837473B0-CC2E-450A-ABE3-18F120FF3D39}">
-                <a1611:picAttrSrcUrl xmlns:a1611="http://schemas.microsoft.com/office/drawing/2016/11/main" r:id="rId6"/>
-              </a:ext>
-            </a:extLst>
-          </a:blip>
-          <a:stretch>
-            <a:fillRect/>
-          </a:stretch>
-        </p:blipFill>
-        <p:spPr>
-          <a:xfrm>
-            <a:off x="3190322" y="13070969"/>
-            <a:ext cx="4622222" cy="9676190"/>
-          </a:xfrm>
-          <a:prstGeom prst="rect">
-            <a:avLst/>
-          </a:prstGeom>
-        </p:spPr>
-      </p:pic>
-      <p:sp>
-        <p:nvSpPr>
-          <p:cNvPr id="2" name="TextBox 1">
-            <a:extLst>
-              <a:ext uri="{FF2B5EF4-FFF2-40B4-BE49-F238E27FC236}">
-                <a16:creationId xmlns:a16="http://schemas.microsoft.com/office/drawing/2014/main" id="{E87C6C9A-E424-427F-BC58-7AF7A2D186F8}"/>
-              </a:ext>
-            </a:extLst>
-          </p:cNvPr>
-          <p:cNvSpPr txBox="1"/>
-          <p:nvPr/>
-        </p:nvSpPr>
-        <p:spPr>
-          <a:xfrm>
-            <a:off x="12304713" y="22022108"/>
-            <a:ext cx="9640887" cy="523220"/>
-          </a:xfrm>
-          <a:prstGeom prst="rect">
-            <a:avLst/>
-          </a:prstGeom>
-          <a:noFill/>
-        </p:spPr>
-        <p:txBody>
-          <a:bodyPr wrap="square" rtlCol="0">
-            <a:spAutoFit/>
-          </a:bodyPr>
-          <a:lstStyle/>
-          <a:p>
-            <a:r>
-              <a:rPr lang="en-US" sz="2800" dirty="0">
-                <a:latin typeface="Verdana Regular"/>
-              </a:rPr>
-              <a:t>Figure 1: Example of old handwritten form</a:t>
-            </a:r>
-          </a:p>
-        </p:txBody>
-      </p:sp>
-      <p:sp>
-        <p:nvSpPr>
-          <p:cNvPr id="19" name="TextBox 18">
-            <a:extLst>
-              <a:ext uri="{FF2B5EF4-FFF2-40B4-BE49-F238E27FC236}">
-                <a16:creationId xmlns:a16="http://schemas.microsoft.com/office/drawing/2014/main" id="{C3CFA46E-F2FE-40F9-8200-5C2BDDC29D2F}"/>
-              </a:ext>
-            </a:extLst>
-          </p:cNvPr>
-          <p:cNvSpPr txBox="1"/>
-          <p:nvPr/>
-        </p:nvSpPr>
-        <p:spPr>
-          <a:xfrm>
-            <a:off x="21907501" y="22098308"/>
-            <a:ext cx="9640887" cy="523220"/>
-          </a:xfrm>
-          <a:prstGeom prst="rect">
-            <a:avLst/>
-          </a:prstGeom>
-          <a:noFill/>
-        </p:spPr>
-        <p:txBody>
-          <a:bodyPr wrap="square" rtlCol="0">
-            <a:spAutoFit/>
-          </a:bodyPr>
-          <a:lstStyle/>
-          <a:p>
-            <a:r>
-              <a:rPr lang="en-US" sz="2800" dirty="0">
-                <a:latin typeface="Verdana Regular"/>
-              </a:rPr>
-              <a:t>Figure 2: Example of drill log document</a:t>
-            </a:r>
-          </a:p>
-        </p:txBody>
-      </p:sp>
-      <p:pic>
-        <p:nvPicPr>
           <p:cNvPr id="4" name="Picture 3" descr="A picture containing knife&#10;&#10;Description automatically generated">
             <a:extLst>
               <a:ext uri="{FF2B5EF4-FFF2-40B4-BE49-F238E27FC236}">
@@ -4189,10 +4041,10 @@
           <p:nvPr/>
         </p:nvPicPr>
         <p:blipFill>
-          <a:blip r:embed="rId7">
+          <a:blip r:embed="rId4">
             <a:extLst>
               <a:ext uri="{837473B0-CC2E-450A-ABE3-18F120FF3D39}">
-                <a1611:picAttrSrcUrl xmlns:a1611="http://schemas.microsoft.com/office/drawing/2016/11/main" r:id="rId8"/>
+                <a1611:picAttrSrcUrl xmlns:a1611="http://schemas.microsoft.com/office/drawing/2016/11/main" r:id="rId5"/>
               </a:ext>
             </a:extLst>
           </a:blip>
@@ -4240,7 +4092,7 @@
           <a:p>
             <a:r>
               <a:rPr lang="en-US" sz="900" dirty="0">
-                <a:hlinkClick r:id="rId8" tooltip="https://en.wikipedia.org/wiki/Template:Transform-rotate"/>
+                <a:hlinkClick r:id="rId5" tooltip="https://en.wikipedia.org/wiki/Template:Transform-rotate"/>
               </a:rPr>
               <a:t>This Photo</a:t>
             </a:r>
@@ -4250,7 +4102,7 @@
             </a:r>
             <a:r>
               <a:rPr lang="en-US" sz="900" dirty="0">
-                <a:hlinkClick r:id="rId9" tooltip="https://creativecommons.org/licenses/by-sa/3.0/"/>
+                <a:hlinkClick r:id="rId6" tooltip="https://creativecommons.org/licenses/by-sa/3.0/"/>
               </a:rPr>
               <a:t>CC BY-SA</a:t>
             </a:r>
@@ -4290,7 +4142,7 @@
               <a:rPr lang="en-US" sz="2800" dirty="0">
                 <a:latin typeface="Verdana Regular"/>
               </a:rPr>
-              <a:t>Figure: Either photo of matt, or image from Victoria’s project showing what our outputted data is being used for.</a:t>
+              <a:t>Figure 3: Image from Victoria’s project showing what our outputted data is being used for.</a:t>
             </a:r>
           </a:p>
         </p:txBody>
@@ -4346,7 +4198,7 @@
         </p:nvSpPr>
         <p:spPr>
           <a:xfrm>
-            <a:off x="1931989" y="22948750"/>
+            <a:off x="1864063" y="25617227"/>
             <a:ext cx="8158689" cy="523220"/>
           </a:xfrm>
           <a:prstGeom prst="rect">
@@ -4360,6 +4212,7 @@
           </a:bodyPr>
           <a:lstStyle/>
           <a:p>
+            <a:pPr algn="ctr"/>
             <a:r>
               <a:rPr lang="en-US" sz="2800" dirty="0">
                 <a:solidFill>
@@ -4367,17 +4220,47 @@
                 </a:solidFill>
                 <a:latin typeface="Verdana Regular"/>
               </a:rPr>
-              <a:t>Figure 3: Homepage of app, or other page</a:t>
+              <a:t>Figure 2: Example output of app</a:t>
             </a:r>
           </a:p>
         </p:txBody>
       </p:sp>
+      <p:pic>
+        <p:nvPicPr>
+          <p:cNvPr id="32" name="Picture 31" descr="A screenshot of a cell phone&#10;&#10;Description automatically generated">
+            <a:extLst>
+              <a:ext uri="{FF2B5EF4-FFF2-40B4-BE49-F238E27FC236}">
+                <a16:creationId xmlns:a16="http://schemas.microsoft.com/office/drawing/2014/main" id="{51F8E372-F6C5-4145-A088-2101BE20CD9D}"/>
+              </a:ext>
+            </a:extLst>
+          </p:cNvPr>
+          <p:cNvPicPr>
+            <a:picLocks noChangeAspect="1"/>
+          </p:cNvPicPr>
+          <p:nvPr/>
+        </p:nvPicPr>
+        <p:blipFill>
+          <a:blip r:embed="rId7"/>
+          <a:stretch>
+            <a:fillRect/>
+          </a:stretch>
+        </p:blipFill>
+        <p:spPr>
+          <a:xfrm>
+            <a:off x="13413743" y="7142746"/>
+            <a:ext cx="17063714" cy="15210053"/>
+          </a:xfrm>
+          <a:prstGeom prst="rect">
+            <a:avLst/>
+          </a:prstGeom>
+        </p:spPr>
+      </p:pic>
       <p:sp>
         <p:nvSpPr>
-          <p:cNvPr id="25" name="TextBox 24">
+          <p:cNvPr id="33" name="TextBox 32">
             <a:extLst>
               <a:ext uri="{FF2B5EF4-FFF2-40B4-BE49-F238E27FC236}">
-                <a16:creationId xmlns:a16="http://schemas.microsoft.com/office/drawing/2014/main" id="{50352E22-BF8F-4C4D-8C98-ED18B6F78192}"/>
+                <a16:creationId xmlns:a16="http://schemas.microsoft.com/office/drawing/2014/main" id="{66052B4B-B277-4D73-86D4-92F367248C60}"/>
               </a:ext>
             </a:extLst>
           </p:cNvPr>
@@ -4386,8 +4269,8 @@
         </p:nvSpPr>
         <p:spPr>
           <a:xfrm>
-            <a:off x="12304713" y="9376697"/>
-            <a:ext cx="19012259" cy="523220"/>
+            <a:off x="17948346" y="22461848"/>
+            <a:ext cx="7994507" cy="523220"/>
           </a:xfrm>
           <a:prstGeom prst="rect">
             <a:avLst/>
@@ -4404,11 +4287,41 @@
               <a:rPr lang="en-US" sz="2800" dirty="0">
                 <a:latin typeface="Verdana Regular"/>
               </a:rPr>
-              <a:t>Figures below could be replaced with flowchart of application.</a:t>
+              <a:t>Figure 1: Flowchart of document creation.</a:t>
             </a:r>
           </a:p>
         </p:txBody>
       </p:sp>
+      <p:pic>
+        <p:nvPicPr>
+          <p:cNvPr id="35" name="Picture 34" descr="A close up of electronics&#10;&#10;Description automatically generated">
+            <a:extLst>
+              <a:ext uri="{FF2B5EF4-FFF2-40B4-BE49-F238E27FC236}">
+                <a16:creationId xmlns:a16="http://schemas.microsoft.com/office/drawing/2014/main" id="{040288B6-57EC-4C7B-A7E7-D4673323356B}"/>
+              </a:ext>
+            </a:extLst>
+          </p:cNvPr>
+          <p:cNvPicPr>
+            <a:picLocks noChangeAspect="1"/>
+          </p:cNvPicPr>
+          <p:nvPr/>
+        </p:nvPicPr>
+        <p:blipFill>
+          <a:blip r:embed="rId8"/>
+          <a:stretch>
+            <a:fillRect/>
+          </a:stretch>
+        </p:blipFill>
+        <p:spPr>
+          <a:xfrm>
+            <a:off x="3081672" y="13579409"/>
+            <a:ext cx="5753397" cy="11776208"/>
+          </a:xfrm>
+          <a:prstGeom prst="rect">
+            <a:avLst/>
+          </a:prstGeom>
+        </p:spPr>
+      </p:pic>
     </p:spTree>
     <p:extLst>
       <p:ext uri="{BB962C8B-B14F-4D97-AF65-F5344CB8AC3E}">

</xml_diff>